<commit_message>
Added a slide on separators to the powerpoint
</commit_message>
<xml_diff>
--- a/file_input_output.pptx
+++ b/file_input_output.pptx
@@ -12,7 +12,8 @@
     <p:sldId id="261" r:id="rId6"/>
     <p:sldId id="262" r:id="rId7"/>
     <p:sldId id="264" r:id="rId8"/>
-    <p:sldId id="263" r:id="rId9"/>
+    <p:sldId id="265" r:id="rId9"/>
+    <p:sldId id="263" r:id="rId10"/>
   </p:sldIdLst>
   <p:sldSz cx="12192000" cy="6858000"/>
   <p:notesSz cx="6858000" cy="9144000"/>
@@ -111,6 +112,11 @@
       </a:defRPr>
     </a:lvl9pPr>
   </p:defaultTextStyle>
+  <p:extLst>
+    <p:ext uri="{EFAFB233-063F-42B5-8137-9DF3F51BA10A}">
+      <p15:sldGuideLst xmlns:p15="http://schemas.microsoft.com/office/powerpoint/2012/main"/>
+    </p:ext>
+  </p:extLst>
 </p:presentation>
 </file>
 
@@ -245,7 +251,7 @@
           <a:p>
             <a:fld id="{72CE7750-43E6-4D04-B774-23CC22F81302}" type="datetimeFigureOut">
               <a:rPr lang="en-US" smtClean="0"/>
-              <a:t>9/13/2021</a:t>
+              <a:t>9/14/2021</a:t>
             </a:fld>
             <a:endParaRPr lang="en-US"/>
           </a:p>
@@ -415,7 +421,7 @@
           <a:p>
             <a:fld id="{72CE7750-43E6-4D04-B774-23CC22F81302}" type="datetimeFigureOut">
               <a:rPr lang="en-US" smtClean="0"/>
-              <a:t>9/13/2021</a:t>
+              <a:t>9/14/2021</a:t>
             </a:fld>
             <a:endParaRPr lang="en-US"/>
           </a:p>
@@ -595,7 +601,7 @@
           <a:p>
             <a:fld id="{72CE7750-43E6-4D04-B774-23CC22F81302}" type="datetimeFigureOut">
               <a:rPr lang="en-US" smtClean="0"/>
-              <a:t>9/13/2021</a:t>
+              <a:t>9/14/2021</a:t>
             </a:fld>
             <a:endParaRPr lang="en-US"/>
           </a:p>
@@ -765,7 +771,7 @@
           <a:p>
             <a:fld id="{72CE7750-43E6-4D04-B774-23CC22F81302}" type="datetimeFigureOut">
               <a:rPr lang="en-US" smtClean="0"/>
-              <a:t>9/13/2021</a:t>
+              <a:t>9/14/2021</a:t>
             </a:fld>
             <a:endParaRPr lang="en-US"/>
           </a:p>
@@ -1011,7 +1017,7 @@
           <a:p>
             <a:fld id="{72CE7750-43E6-4D04-B774-23CC22F81302}" type="datetimeFigureOut">
               <a:rPr lang="en-US" smtClean="0"/>
-              <a:t>9/13/2021</a:t>
+              <a:t>9/14/2021</a:t>
             </a:fld>
             <a:endParaRPr lang="en-US"/>
           </a:p>
@@ -1243,7 +1249,7 @@
           <a:p>
             <a:fld id="{72CE7750-43E6-4D04-B774-23CC22F81302}" type="datetimeFigureOut">
               <a:rPr lang="en-US" smtClean="0"/>
-              <a:t>9/13/2021</a:t>
+              <a:t>9/14/2021</a:t>
             </a:fld>
             <a:endParaRPr lang="en-US"/>
           </a:p>
@@ -1610,7 +1616,7 @@
           <a:p>
             <a:fld id="{72CE7750-43E6-4D04-B774-23CC22F81302}" type="datetimeFigureOut">
               <a:rPr lang="en-US" smtClean="0"/>
-              <a:t>9/13/2021</a:t>
+              <a:t>9/14/2021</a:t>
             </a:fld>
             <a:endParaRPr lang="en-US"/>
           </a:p>
@@ -1728,7 +1734,7 @@
           <a:p>
             <a:fld id="{72CE7750-43E6-4D04-B774-23CC22F81302}" type="datetimeFigureOut">
               <a:rPr lang="en-US" smtClean="0"/>
-              <a:t>9/13/2021</a:t>
+              <a:t>9/14/2021</a:t>
             </a:fld>
             <a:endParaRPr lang="en-US"/>
           </a:p>
@@ -1823,7 +1829,7 @@
           <a:p>
             <a:fld id="{72CE7750-43E6-4D04-B774-23CC22F81302}" type="datetimeFigureOut">
               <a:rPr lang="en-US" smtClean="0"/>
-              <a:t>9/13/2021</a:t>
+              <a:t>9/14/2021</a:t>
             </a:fld>
             <a:endParaRPr lang="en-US"/>
           </a:p>
@@ -2100,7 +2106,7 @@
           <a:p>
             <a:fld id="{72CE7750-43E6-4D04-B774-23CC22F81302}" type="datetimeFigureOut">
               <a:rPr lang="en-US" smtClean="0"/>
-              <a:t>9/13/2021</a:t>
+              <a:t>9/14/2021</a:t>
             </a:fld>
             <a:endParaRPr lang="en-US"/>
           </a:p>
@@ -2357,7 +2363,7 @@
           <a:p>
             <a:fld id="{72CE7750-43E6-4D04-B774-23CC22F81302}" type="datetimeFigureOut">
               <a:rPr lang="en-US" smtClean="0"/>
-              <a:t>9/13/2021</a:t>
+              <a:t>9/14/2021</a:t>
             </a:fld>
             <a:endParaRPr lang="en-US"/>
           </a:p>
@@ -2570,7 +2576,7 @@
           <a:p>
             <a:fld id="{72CE7750-43E6-4D04-B774-23CC22F81302}" type="datetimeFigureOut">
               <a:rPr lang="en-US" smtClean="0"/>
-              <a:t>9/13/2021</a:t>
+              <a:t>9/14/2021</a:t>
             </a:fld>
             <a:endParaRPr lang="en-US"/>
           </a:p>
@@ -4015,6 +4021,175 @@
           <p:cNvPr id="2" name="Title 1">
             <a:extLst>
               <a:ext uri="{FF2B5EF4-FFF2-40B4-BE49-F238E27FC236}">
+                <a16:creationId xmlns:a16="http://schemas.microsoft.com/office/drawing/2014/main" id="{394030DE-5955-46F6-ABC2-1C6B53C6BE7D}"/>
+              </a:ext>
+            </a:extLst>
+          </p:cNvPr>
+          <p:cNvSpPr>
+            <a:spLocks noGrp="1"/>
+          </p:cNvSpPr>
+          <p:nvPr>
+            <p:ph type="title"/>
+          </p:nvPr>
+        </p:nvSpPr>
+        <p:spPr/>
+        <p:txBody>
+          <a:bodyPr/>
+          <a:lstStyle/>
+          <a:p>
+            <a:r>
+              <a:rPr lang="en-US" dirty="0"/>
+              <a:t>A note on file separators</a:t>
+            </a:r>
+          </a:p>
+        </p:txBody>
+      </p:sp>
+      <p:sp>
+        <p:nvSpPr>
+          <p:cNvPr id="3" name="Content Placeholder 2">
+            <a:extLst>
+              <a:ext uri="{FF2B5EF4-FFF2-40B4-BE49-F238E27FC236}">
+                <a16:creationId xmlns:a16="http://schemas.microsoft.com/office/drawing/2014/main" id="{753022E0-2572-46C2-9DAF-47753ED4082F}"/>
+              </a:ext>
+            </a:extLst>
+          </p:cNvPr>
+          <p:cNvSpPr>
+            <a:spLocks noGrp="1"/>
+          </p:cNvSpPr>
+          <p:nvPr>
+            <p:ph idx="1"/>
+          </p:nvPr>
+        </p:nvSpPr>
+        <p:spPr/>
+        <p:txBody>
+          <a:bodyPr>
+            <a:normAutofit fontScale="92500" lnSpcReduction="10000"/>
+          </a:bodyPr>
+          <a:lstStyle/>
+          <a:p>
+            <a:pPr marL="0" indent="0">
+              <a:buNone/>
+            </a:pPr>
+            <a:r>
+              <a:rPr lang="en-US" dirty="0"/>
+              <a:t>Windows uses “\” to separate files and directories in </a:t>
+            </a:r>
+            <a:r>
+              <a:rPr lang="en-US" dirty="0" err="1"/>
+              <a:t>filepaths</a:t>
+            </a:r>
+            <a:endParaRPr lang="en-US" dirty="0"/>
+          </a:p>
+          <a:p>
+            <a:pPr marL="0" indent="0">
+              <a:buNone/>
+            </a:pPr>
+            <a:endParaRPr lang="en-US" dirty="0"/>
+          </a:p>
+          <a:p>
+            <a:pPr marL="0" indent="0">
+              <a:buNone/>
+            </a:pPr>
+            <a:r>
+              <a:rPr lang="en-US" dirty="0"/>
+              <a:t>Unix systems use  “/” to separate files and directories in </a:t>
+            </a:r>
+            <a:r>
+              <a:rPr lang="en-US" dirty="0" err="1"/>
+              <a:t>filepaths</a:t>
+            </a:r>
+            <a:endParaRPr lang="en-US" dirty="0"/>
+          </a:p>
+          <a:p>
+            <a:pPr marL="0" indent="0">
+              <a:buNone/>
+            </a:pPr>
+            <a:endParaRPr lang="en-US" dirty="0"/>
+          </a:p>
+          <a:p>
+            <a:pPr marL="0" indent="0">
+              <a:buNone/>
+            </a:pPr>
+            <a:r>
+              <a:rPr lang="en-US" dirty="0"/>
+              <a:t>As a lazy solution for interoperability, python will recognize “/” as working on Windows systems. The reverse is not true.</a:t>
+            </a:r>
+          </a:p>
+          <a:p>
+            <a:pPr marL="0" indent="0">
+              <a:buNone/>
+            </a:pPr>
+            <a:endParaRPr lang="en-US" dirty="0"/>
+          </a:p>
+          <a:p>
+            <a:pPr marL="0" indent="0">
+              <a:buNone/>
+            </a:pPr>
+            <a:r>
+              <a:rPr lang="en-US" dirty="0"/>
+              <a:t>This is a bit of a hack that only works for small scripts.</a:t>
+            </a:r>
+          </a:p>
+          <a:p>
+            <a:pPr marL="0" indent="0">
+              <a:buNone/>
+            </a:pPr>
+            <a:endParaRPr lang="en-US" dirty="0"/>
+          </a:p>
+          <a:p>
+            <a:pPr marL="0" indent="0">
+              <a:buNone/>
+            </a:pPr>
+            <a:r>
+              <a:rPr lang="en-US" dirty="0"/>
+              <a:t>A more professional solution would be to use the </a:t>
+            </a:r>
+            <a:r>
+              <a:rPr lang="en-US" dirty="0" err="1"/>
+              <a:t>pathlib</a:t>
+            </a:r>
+            <a:r>
+              <a:rPr lang="en-US" dirty="0"/>
+              <a:t> module.</a:t>
+            </a:r>
+          </a:p>
+        </p:txBody>
+      </p:sp>
+    </p:spTree>
+    <p:extLst>
+      <p:ext uri="{BB962C8B-B14F-4D97-AF65-F5344CB8AC3E}">
+        <p14:creationId xmlns:p14="http://schemas.microsoft.com/office/powerpoint/2010/main" val="2549683811"/>
+      </p:ext>
+    </p:extLst>
+  </p:cSld>
+  <p:clrMapOvr>
+    <a:masterClrMapping/>
+  </p:clrMapOvr>
+</p:sld>
+</file>
+
+<file path=ppt/slides/slide9.xml><?xml version="1.0" encoding="utf-8"?>
+<p:sld xmlns:a="http://schemas.openxmlformats.org/drawingml/2006/main" xmlns:r="http://schemas.openxmlformats.org/officeDocument/2006/relationships" xmlns:p="http://schemas.openxmlformats.org/presentationml/2006/main">
+  <p:cSld>
+    <p:spTree>
+      <p:nvGrpSpPr>
+        <p:cNvPr id="1" name=""/>
+        <p:cNvGrpSpPr/>
+        <p:nvPr/>
+      </p:nvGrpSpPr>
+      <p:grpSpPr>
+        <a:xfrm>
+          <a:off x="0" y="0"/>
+          <a:ext cx="0" cy="0"/>
+          <a:chOff x="0" y="0"/>
+          <a:chExt cx="0" cy="0"/>
+        </a:xfrm>
+      </p:grpSpPr>
+      <p:sp>
+        <p:nvSpPr>
+          <p:cNvPr id="2" name="Title 1">
+            <a:extLst>
+              <a:ext uri="{FF2B5EF4-FFF2-40B4-BE49-F238E27FC236}">
                 <a16:creationId xmlns:a16="http://schemas.microsoft.com/office/drawing/2014/main" id="{279F3CD0-6558-43EE-A898-C54E0C9B2715}"/>
               </a:ext>
             </a:extLst>

</xml_diff>